<commit_message>
added switch cases for menus
</commit_message>
<xml_diff>
--- a/ControllerBranch.pptx
+++ b/ControllerBranch.pptx
@@ -104,6 +104,11 @@
       </a:defRPr>
     </a:lvl9pPr>
   </p:defaultTextStyle>
+  <p:extLst>
+    <p:ext uri="{EFAFB233-063F-42B5-8137-9DF3F51BA10A}">
+      <p15:sldGuideLst xmlns:p15="http://schemas.microsoft.com/office/powerpoint/2012/main"/>
+    </p:ext>
+  </p:extLst>
 </p:presentation>
 </file>
 
@@ -3455,7 +3460,7 @@
         <p:spPr>
           <a:xfrm>
             <a:off x="1941094" y="169778"/>
-            <a:ext cx="1942095" cy="1384995"/>
+            <a:ext cx="1942095" cy="1569660"/>
           </a:xfrm>
           <a:prstGeom prst="rect">
             <a:avLst/>
@@ -3505,6 +3510,17 @@
               <a:rPr lang="en-GB" sz="1200" dirty="0"/>
               <a:t>Browse shows by date</a:t>
             </a:r>
+          </a:p>
+          <a:p>
+            <a:pPr marL="342900" indent="-342900">
+              <a:buFontTx/>
+              <a:buAutoNum type="arabicPeriod"/>
+            </a:pPr>
+            <a:r>
+              <a:rPr lang="en-GB" sz="1200"/>
+              <a:t>Main menu</a:t>
+            </a:r>
+            <a:endParaRPr lang="en-GB" sz="1200" dirty="0"/>
           </a:p>
           <a:p>
             <a:pPr marL="342900" indent="-342900">
@@ -3591,20 +3607,21 @@
           </a:p>
           <a:p>
             <a:pPr marL="342900" indent="-342900">
+              <a:buFontTx/>
+              <a:buAutoNum type="arabicPeriod"/>
+            </a:pPr>
+            <a:r>
+              <a:rPr lang="en-GB" sz="1200" dirty="0"/>
+              <a:t>Buy ticket</a:t>
+            </a:r>
+          </a:p>
+          <a:p>
+            <a:pPr marL="342900" indent="-342900">
               <a:buAutoNum type="arabicPeriod"/>
             </a:pPr>
             <a:r>
               <a:rPr lang="en-GB" sz="1200" dirty="0"/>
               <a:t>Show calendar </a:t>
-            </a:r>
-          </a:p>
-          <a:p>
-            <a:pPr marL="342900" indent="-342900">
-              <a:buAutoNum type="arabicPeriod"/>
-            </a:pPr>
-            <a:r>
-              <a:rPr lang="en-GB" sz="1200" dirty="0"/>
-              <a:t>Buy ticket</a:t>
             </a:r>
           </a:p>
           <a:p>
@@ -3699,20 +3716,21 @@
           </a:p>
           <a:p>
             <a:pPr marL="342900" indent="-342900">
+              <a:buFontTx/>
+              <a:buAutoNum type="arabicPeriod"/>
+            </a:pPr>
+            <a:r>
+              <a:rPr lang="en-GB" sz="1200" dirty="0"/>
+              <a:t>Buy ticket</a:t>
+            </a:r>
+          </a:p>
+          <a:p>
+            <a:pPr marL="342900" indent="-342900">
               <a:buAutoNum type="arabicPeriod"/>
             </a:pPr>
             <a:r>
               <a:rPr lang="en-GB" sz="1200" dirty="0"/>
               <a:t>Show calendar </a:t>
-            </a:r>
-          </a:p>
-          <a:p>
-            <a:pPr marL="342900" indent="-342900">
-              <a:buAutoNum type="arabicPeriod"/>
-            </a:pPr>
-            <a:r>
-              <a:rPr lang="en-GB" sz="1200" dirty="0"/>
-              <a:t>Buy ticket</a:t>
             </a:r>
           </a:p>
           <a:p>
@@ -3807,20 +3825,21 @@
           </a:p>
           <a:p>
             <a:pPr marL="342900" indent="-342900">
+              <a:buFontTx/>
+              <a:buAutoNum type="arabicPeriod"/>
+            </a:pPr>
+            <a:r>
+              <a:rPr lang="en-GB" sz="1200" dirty="0"/>
+              <a:t>Buy ticket</a:t>
+            </a:r>
+          </a:p>
+          <a:p>
+            <a:pPr marL="342900" indent="-342900">
               <a:buAutoNum type="arabicPeriod"/>
             </a:pPr>
             <a:r>
               <a:rPr lang="en-GB" sz="1200" dirty="0"/>
               <a:t>Show calendar </a:t>
-            </a:r>
-          </a:p>
-          <a:p>
-            <a:pPr marL="342900" indent="-342900">
-              <a:buAutoNum type="arabicPeriod"/>
-            </a:pPr>
-            <a:r>
-              <a:rPr lang="en-GB" sz="1200" dirty="0"/>
-              <a:t>Buy ticket</a:t>
             </a:r>
           </a:p>
           <a:p>

</xml_diff>

<commit_message>
made updates to backendcontroller and dbconnector
formatted output, display count available, cleaned up repeated code
</commit_message>
<xml_diff>
--- a/ControllerBranch.pptx
+++ b/ControllerBranch.pptx
@@ -261,7 +261,7 @@
           <a:p>
             <a:fld id="{1482FB96-7BAC-4153-9DA8-54F20657E046}" type="datetimeFigureOut">
               <a:rPr lang="en-GB" smtClean="0"/>
-              <a:t>08/07/2022</a:t>
+              <a:t>11/07/2022</a:t>
             </a:fld>
             <a:endParaRPr lang="en-GB"/>
           </a:p>
@@ -461,7 +461,7 @@
           <a:p>
             <a:fld id="{1482FB96-7BAC-4153-9DA8-54F20657E046}" type="datetimeFigureOut">
               <a:rPr lang="en-GB" smtClean="0"/>
-              <a:t>08/07/2022</a:t>
+              <a:t>11/07/2022</a:t>
             </a:fld>
             <a:endParaRPr lang="en-GB"/>
           </a:p>
@@ -671,7 +671,7 @@
           <a:p>
             <a:fld id="{1482FB96-7BAC-4153-9DA8-54F20657E046}" type="datetimeFigureOut">
               <a:rPr lang="en-GB" smtClean="0"/>
-              <a:t>08/07/2022</a:t>
+              <a:t>11/07/2022</a:t>
             </a:fld>
             <a:endParaRPr lang="en-GB"/>
           </a:p>
@@ -871,7 +871,7 @@
           <a:p>
             <a:fld id="{1482FB96-7BAC-4153-9DA8-54F20657E046}" type="datetimeFigureOut">
               <a:rPr lang="en-GB" smtClean="0"/>
-              <a:t>08/07/2022</a:t>
+              <a:t>11/07/2022</a:t>
             </a:fld>
             <a:endParaRPr lang="en-GB"/>
           </a:p>
@@ -1147,7 +1147,7 @@
           <a:p>
             <a:fld id="{1482FB96-7BAC-4153-9DA8-54F20657E046}" type="datetimeFigureOut">
               <a:rPr lang="en-GB" smtClean="0"/>
-              <a:t>08/07/2022</a:t>
+              <a:t>11/07/2022</a:t>
             </a:fld>
             <a:endParaRPr lang="en-GB"/>
           </a:p>
@@ -1415,7 +1415,7 @@
           <a:p>
             <a:fld id="{1482FB96-7BAC-4153-9DA8-54F20657E046}" type="datetimeFigureOut">
               <a:rPr lang="en-GB" smtClean="0"/>
-              <a:t>08/07/2022</a:t>
+              <a:t>11/07/2022</a:t>
             </a:fld>
             <a:endParaRPr lang="en-GB"/>
           </a:p>
@@ -1830,7 +1830,7 @@
           <a:p>
             <a:fld id="{1482FB96-7BAC-4153-9DA8-54F20657E046}" type="datetimeFigureOut">
               <a:rPr lang="en-GB" smtClean="0"/>
-              <a:t>08/07/2022</a:t>
+              <a:t>11/07/2022</a:t>
             </a:fld>
             <a:endParaRPr lang="en-GB"/>
           </a:p>
@@ -1972,7 +1972,7 @@
           <a:p>
             <a:fld id="{1482FB96-7BAC-4153-9DA8-54F20657E046}" type="datetimeFigureOut">
               <a:rPr lang="en-GB" smtClean="0"/>
-              <a:t>08/07/2022</a:t>
+              <a:t>11/07/2022</a:t>
             </a:fld>
             <a:endParaRPr lang="en-GB"/>
           </a:p>
@@ -2085,7 +2085,7 @@
           <a:p>
             <a:fld id="{1482FB96-7BAC-4153-9DA8-54F20657E046}" type="datetimeFigureOut">
               <a:rPr lang="en-GB" smtClean="0"/>
-              <a:t>08/07/2022</a:t>
+              <a:t>11/07/2022</a:t>
             </a:fld>
             <a:endParaRPr lang="en-GB"/>
           </a:p>
@@ -2398,7 +2398,7 @@
           <a:p>
             <a:fld id="{1482FB96-7BAC-4153-9DA8-54F20657E046}" type="datetimeFigureOut">
               <a:rPr lang="en-GB" smtClean="0"/>
-              <a:t>08/07/2022</a:t>
+              <a:t>11/07/2022</a:t>
             </a:fld>
             <a:endParaRPr lang="en-GB"/>
           </a:p>
@@ -2687,7 +2687,7 @@
           <a:p>
             <a:fld id="{1482FB96-7BAC-4153-9DA8-54F20657E046}" type="datetimeFigureOut">
               <a:rPr lang="en-GB" smtClean="0"/>
-              <a:t>08/07/2022</a:t>
+              <a:t>11/07/2022</a:t>
             </a:fld>
             <a:endParaRPr lang="en-GB"/>
           </a:p>
@@ -2930,7 +2930,7 @@
           <a:p>
             <a:fld id="{1482FB96-7BAC-4153-9DA8-54F20657E046}" type="datetimeFigureOut">
               <a:rPr lang="en-GB" smtClean="0"/>
-              <a:t>08/07/2022</a:t>
+              <a:t>11/07/2022</a:t>
             </a:fld>
             <a:endParaRPr lang="en-GB"/>
           </a:p>
@@ -4117,6 +4117,92 @@
           </a:p>
         </p:txBody>
       </p:sp>
+      <p:sp>
+        <p:nvSpPr>
+          <p:cNvPr id="11" name="TextBox 10">
+            <a:extLst>
+              <a:ext uri="{FF2B5EF4-FFF2-40B4-BE49-F238E27FC236}">
+                <a16:creationId xmlns:a16="http://schemas.microsoft.com/office/drawing/2014/main" id="{EDE1BFDC-E3DC-8973-FA43-6EF8262355D7}"/>
+              </a:ext>
+            </a:extLst>
+          </p:cNvPr>
+          <p:cNvSpPr txBox="1"/>
+          <p:nvPr/>
+        </p:nvSpPr>
+        <p:spPr>
+          <a:xfrm>
+            <a:off x="42103" y="2487528"/>
+            <a:ext cx="1690436" cy="1384995"/>
+          </a:xfrm>
+          <a:prstGeom prst="rect">
+            <a:avLst/>
+          </a:prstGeom>
+          <a:noFill/>
+          <a:ln w="6350">
+            <a:solidFill>
+              <a:schemeClr val="tx1"/>
+            </a:solidFill>
+          </a:ln>
+        </p:spPr>
+        <p:txBody>
+          <a:bodyPr wrap="square" rtlCol="0">
+            <a:spAutoFit/>
+          </a:bodyPr>
+          <a:lstStyle/>
+          <a:p>
+            <a:r>
+              <a:rPr lang="en-GB" sz="1200" b="1" dirty="0"/>
+              <a:t>Employee menu (will need verification?</a:t>
+            </a:r>
+          </a:p>
+          <a:p>
+            <a:pPr marL="342900" indent="-342900">
+              <a:buFontTx/>
+              <a:buAutoNum type="arabicPeriod"/>
+            </a:pPr>
+            <a:r>
+              <a:rPr lang="en-GB" sz="1200" dirty="0"/>
+              <a:t>View all shows</a:t>
+            </a:r>
+          </a:p>
+          <a:p>
+            <a:pPr marL="342900" indent="-342900">
+              <a:buFontTx/>
+              <a:buAutoNum type="arabicPeriod"/>
+            </a:pPr>
+            <a:r>
+              <a:rPr lang="en-GB" sz="1200" dirty="0"/>
+              <a:t>Add show</a:t>
+            </a:r>
+          </a:p>
+          <a:p>
+            <a:pPr marL="342900" indent="-342900">
+              <a:buFontTx/>
+              <a:buAutoNum type="arabicPeriod"/>
+            </a:pPr>
+            <a:r>
+              <a:rPr lang="en-GB" sz="1200" dirty="0"/>
+              <a:t>Delete show</a:t>
+            </a:r>
+          </a:p>
+          <a:p>
+            <a:pPr marL="342900" indent="-342900">
+              <a:buFontTx/>
+              <a:buAutoNum type="arabicPeriod"/>
+            </a:pPr>
+            <a:r>
+              <a:rPr lang="en-GB" sz="1200" dirty="0"/>
+              <a:t>Main menu</a:t>
+            </a:r>
+          </a:p>
+          <a:p>
+            <a:pPr marL="342900" indent="-342900">
+              <a:buAutoNum type="arabicPeriod"/>
+            </a:pPr>
+            <a:endParaRPr lang="en-GB" sz="1200" dirty="0"/>
+          </a:p>
+        </p:txBody>
+      </p:sp>
     </p:spTree>
     <p:extLst>
       <p:ext uri="{BB962C8B-B14F-4D97-AF65-F5344CB8AC3E}">

</xml_diff>

<commit_message>
updates to pptx, dbconnector
</commit_message>
<xml_diff>
--- a/ControllerBranch.pptx
+++ b/ControllerBranch.pptx
@@ -6,6 +6,7 @@
   </p:sldMasterIdLst>
   <p:sldIdLst>
     <p:sldId id="256" r:id="rId2"/>
+    <p:sldId id="257" r:id="rId3"/>
   </p:sldIdLst>
   <p:sldSz cx="12192000" cy="6858000"/>
   <p:notesSz cx="6858000" cy="9144000"/>
@@ -261,7 +262,7 @@
           <a:p>
             <a:fld id="{1482FB96-7BAC-4153-9DA8-54F20657E046}" type="datetimeFigureOut">
               <a:rPr lang="en-GB" smtClean="0"/>
-              <a:t>11/07/2022</a:t>
+              <a:t>12/07/2022</a:t>
             </a:fld>
             <a:endParaRPr lang="en-GB"/>
           </a:p>
@@ -461,7 +462,7 @@
           <a:p>
             <a:fld id="{1482FB96-7BAC-4153-9DA8-54F20657E046}" type="datetimeFigureOut">
               <a:rPr lang="en-GB" smtClean="0"/>
-              <a:t>11/07/2022</a:t>
+              <a:t>12/07/2022</a:t>
             </a:fld>
             <a:endParaRPr lang="en-GB"/>
           </a:p>
@@ -671,7 +672,7 @@
           <a:p>
             <a:fld id="{1482FB96-7BAC-4153-9DA8-54F20657E046}" type="datetimeFigureOut">
               <a:rPr lang="en-GB" smtClean="0"/>
-              <a:t>11/07/2022</a:t>
+              <a:t>12/07/2022</a:t>
             </a:fld>
             <a:endParaRPr lang="en-GB"/>
           </a:p>
@@ -871,7 +872,7 @@
           <a:p>
             <a:fld id="{1482FB96-7BAC-4153-9DA8-54F20657E046}" type="datetimeFigureOut">
               <a:rPr lang="en-GB" smtClean="0"/>
-              <a:t>11/07/2022</a:t>
+              <a:t>12/07/2022</a:t>
             </a:fld>
             <a:endParaRPr lang="en-GB"/>
           </a:p>
@@ -1147,7 +1148,7 @@
           <a:p>
             <a:fld id="{1482FB96-7BAC-4153-9DA8-54F20657E046}" type="datetimeFigureOut">
               <a:rPr lang="en-GB" smtClean="0"/>
-              <a:t>11/07/2022</a:t>
+              <a:t>12/07/2022</a:t>
             </a:fld>
             <a:endParaRPr lang="en-GB"/>
           </a:p>
@@ -1415,7 +1416,7 @@
           <a:p>
             <a:fld id="{1482FB96-7BAC-4153-9DA8-54F20657E046}" type="datetimeFigureOut">
               <a:rPr lang="en-GB" smtClean="0"/>
-              <a:t>11/07/2022</a:t>
+              <a:t>12/07/2022</a:t>
             </a:fld>
             <a:endParaRPr lang="en-GB"/>
           </a:p>
@@ -1830,7 +1831,7 @@
           <a:p>
             <a:fld id="{1482FB96-7BAC-4153-9DA8-54F20657E046}" type="datetimeFigureOut">
               <a:rPr lang="en-GB" smtClean="0"/>
-              <a:t>11/07/2022</a:t>
+              <a:t>12/07/2022</a:t>
             </a:fld>
             <a:endParaRPr lang="en-GB"/>
           </a:p>
@@ -1972,7 +1973,7 @@
           <a:p>
             <a:fld id="{1482FB96-7BAC-4153-9DA8-54F20657E046}" type="datetimeFigureOut">
               <a:rPr lang="en-GB" smtClean="0"/>
-              <a:t>11/07/2022</a:t>
+              <a:t>12/07/2022</a:t>
             </a:fld>
             <a:endParaRPr lang="en-GB"/>
           </a:p>
@@ -2085,7 +2086,7 @@
           <a:p>
             <a:fld id="{1482FB96-7BAC-4153-9DA8-54F20657E046}" type="datetimeFigureOut">
               <a:rPr lang="en-GB" smtClean="0"/>
-              <a:t>11/07/2022</a:t>
+              <a:t>12/07/2022</a:t>
             </a:fld>
             <a:endParaRPr lang="en-GB"/>
           </a:p>
@@ -2398,7 +2399,7 @@
           <a:p>
             <a:fld id="{1482FB96-7BAC-4153-9DA8-54F20657E046}" type="datetimeFigureOut">
               <a:rPr lang="en-GB" smtClean="0"/>
-              <a:t>11/07/2022</a:t>
+              <a:t>12/07/2022</a:t>
             </a:fld>
             <a:endParaRPr lang="en-GB"/>
           </a:p>
@@ -2687,7 +2688,7 @@
           <a:p>
             <a:fld id="{1482FB96-7BAC-4153-9DA8-54F20657E046}" type="datetimeFigureOut">
               <a:rPr lang="en-GB" smtClean="0"/>
-              <a:t>11/07/2022</a:t>
+              <a:t>12/07/2022</a:t>
             </a:fld>
             <a:endParaRPr lang="en-GB"/>
           </a:p>
@@ -2930,7 +2931,7 @@
           <a:p>
             <a:fld id="{1482FB96-7BAC-4153-9DA8-54F20657E046}" type="datetimeFigureOut">
               <a:rPr lang="en-GB" smtClean="0"/>
-              <a:t>11/07/2022</a:t>
+              <a:t>12/07/2022</a:t>
             </a:fld>
             <a:endParaRPr lang="en-GB"/>
           </a:p>
@@ -3405,7 +3406,11 @@
               <a:buAutoNum type="arabicPeriod"/>
             </a:pPr>
             <a:r>
-              <a:rPr lang="en-GB" sz="1200" dirty="0"/>
+              <a:rPr lang="en-GB" sz="1200" dirty="0">
+                <a:highlight>
+                  <a:srgbClr val="FF0000"/>
+                </a:highlight>
+              </a:rPr>
               <a:t>Buy ticket/(s)</a:t>
             </a:r>
           </a:p>
@@ -3415,7 +3420,7 @@
             </a:pPr>
             <a:r>
               <a:rPr lang="en-GB" sz="1200" dirty="0"/>
-              <a:t>Basket</a:t>
+              <a:t>View basket</a:t>
             </a:r>
           </a:p>
           <a:p>
@@ -3555,7 +3560,7 @@
         <p:spPr>
           <a:xfrm>
             <a:off x="4081710" y="169110"/>
-            <a:ext cx="2312062" cy="2123658"/>
+            <a:ext cx="2312062" cy="1938992"/>
           </a:xfrm>
           <a:prstGeom prst="rect">
             <a:avLst/>
@@ -3606,31 +3611,12 @@
             </a:r>
           </a:p>
           <a:p>
-            <a:pPr marL="342900" indent="-342900">
-              <a:buFontTx/>
-              <a:buAutoNum type="arabicPeriod"/>
-            </a:pPr>
-            <a:r>
-              <a:rPr lang="en-GB" sz="1200" dirty="0"/>
-              <a:t>Buy ticket</a:t>
-            </a:r>
-          </a:p>
-          <a:p>
-            <a:pPr marL="342900" indent="-342900">
-              <a:buAutoNum type="arabicPeriod"/>
-            </a:pPr>
-            <a:r>
-              <a:rPr lang="en-GB" sz="1200" dirty="0"/>
-              <a:t>Show calendar </a:t>
-            </a:r>
-          </a:p>
-          <a:p>
-            <a:pPr marL="342900" indent="-342900">
-              <a:buAutoNum type="arabicPeriod"/>
-            </a:pPr>
-            <a:r>
-              <a:rPr lang="en-GB" sz="1200" dirty="0"/>
-              <a:t>Main menu</a:t>
+            <a:endParaRPr lang="en-GB" sz="1200" dirty="0"/>
+          </a:p>
+          <a:p>
+            <a:r>
+              <a:rPr lang="en-GB" sz="1200" b="1" dirty="0"/>
+              <a:t>Loop menu</a:t>
             </a:r>
           </a:p>
           <a:p>
@@ -3662,7 +3648,7 @@
         <p:spPr>
           <a:xfrm>
             <a:off x="4081710" y="2441575"/>
-            <a:ext cx="2312061" cy="2123658"/>
+            <a:ext cx="2312061" cy="1938992"/>
           </a:xfrm>
           <a:prstGeom prst="rect">
             <a:avLst/>
@@ -3716,36 +3702,17 @@
           </a:p>
           <a:p>
             <a:pPr marL="342900" indent="-342900">
-              <a:buFontTx/>
-              <a:buAutoNum type="arabicPeriod"/>
-            </a:pPr>
-            <a:r>
-              <a:rPr lang="en-GB" sz="1200" dirty="0"/>
-              <a:t>Buy ticket</a:t>
-            </a:r>
-          </a:p>
-          <a:p>
-            <a:pPr marL="342900" indent="-342900">
-              <a:buAutoNum type="arabicPeriod"/>
-            </a:pPr>
-            <a:r>
-              <a:rPr lang="en-GB" sz="1200" dirty="0"/>
-              <a:t>Show calendar </a:t>
-            </a:r>
-          </a:p>
-          <a:p>
-            <a:pPr marL="342900" indent="-342900">
-              <a:buAutoNum type="arabicPeriod"/>
-            </a:pPr>
-            <a:r>
-              <a:rPr lang="en-GB" sz="1200" dirty="0"/>
-              <a:t>Main menu</a:t>
-            </a:r>
-          </a:p>
-          <a:p>
-            <a:pPr marL="342900" indent="-342900">
-              <a:buAutoNum type="arabicPeriod"/>
-            </a:pPr>
+              <a:buAutoNum type="arabicPeriod"/>
+            </a:pPr>
+            <a:endParaRPr lang="en-GB" sz="1200" dirty="0"/>
+          </a:p>
+          <a:p>
+            <a:r>
+              <a:rPr lang="en-GB" sz="1200" b="1" dirty="0"/>
+              <a:t>Loop menu</a:t>
+            </a:r>
+          </a:p>
+          <a:p>
             <a:endParaRPr lang="en-GB" sz="1200" dirty="0"/>
           </a:p>
           <a:p>
@@ -3771,7 +3738,7 @@
         <p:spPr>
           <a:xfrm>
             <a:off x="4081710" y="4714040"/>
-            <a:ext cx="2312061" cy="2123658"/>
+            <a:ext cx="2312061" cy="1938992"/>
           </a:xfrm>
           <a:prstGeom prst="rect">
             <a:avLst/>
@@ -3825,30 +3792,14 @@
           </a:p>
           <a:p>
             <a:pPr marL="342900" indent="-342900">
-              <a:buFontTx/>
-              <a:buAutoNum type="arabicPeriod"/>
-            </a:pPr>
-            <a:r>
-              <a:rPr lang="en-GB" sz="1200" dirty="0"/>
-              <a:t>Buy ticket</a:t>
-            </a:r>
-          </a:p>
-          <a:p>
-            <a:pPr marL="342900" indent="-342900">
-              <a:buAutoNum type="arabicPeriod"/>
-            </a:pPr>
-            <a:r>
-              <a:rPr lang="en-GB" sz="1200" dirty="0"/>
-              <a:t>Show calendar </a:t>
-            </a:r>
-          </a:p>
-          <a:p>
-            <a:pPr marL="342900" indent="-342900">
-              <a:buAutoNum type="arabicPeriod"/>
-            </a:pPr>
-            <a:r>
-              <a:rPr lang="en-GB" sz="1200" dirty="0"/>
-              <a:t>Main menu</a:t>
+              <a:buAutoNum type="arabicPeriod"/>
+            </a:pPr>
+            <a:endParaRPr lang="en-GB" sz="1200" dirty="0"/>
+          </a:p>
+          <a:p>
+            <a:r>
+              <a:rPr lang="en-GB" sz="1200" b="1" dirty="0"/>
+              <a:t>Loop menu</a:t>
             </a:r>
           </a:p>
           <a:p>
@@ -3880,7 +3831,7 @@
         <p:spPr>
           <a:xfrm>
             <a:off x="6629400" y="162760"/>
-            <a:ext cx="2971800" cy="3600986"/>
+            <a:ext cx="2971800" cy="3231654"/>
           </a:xfrm>
           <a:prstGeom prst="rect">
             <a:avLst/>
@@ -3909,7 +3860,7 @@
             </a:pPr>
             <a:r>
               <a:rPr lang="en-GB" sz="1200" dirty="0"/>
-              <a:t>Input performance ID</a:t>
+              <a:t>Input performance no.</a:t>
             </a:r>
           </a:p>
           <a:p>
@@ -3992,30 +3943,9 @@
             <a:endParaRPr lang="en-GB" sz="1200" dirty="0"/>
           </a:p>
           <a:p>
-            <a:pPr marL="1257300" lvl="2" indent="-342900">
-              <a:buAutoNum type="arabicPeriod"/>
-            </a:pPr>
-            <a:r>
-              <a:rPr lang="en-GB" sz="1200" dirty="0"/>
-              <a:t>Buy ticket</a:t>
-            </a:r>
-          </a:p>
-          <a:p>
-            <a:pPr marL="1257300" lvl="2" indent="-342900">
-              <a:buAutoNum type="arabicPeriod"/>
-            </a:pPr>
-            <a:r>
-              <a:rPr lang="en-GB" sz="1200" dirty="0"/>
-              <a:t>Show calendar*</a:t>
-            </a:r>
-          </a:p>
-          <a:p>
-            <a:pPr marL="1257300" lvl="2" indent="-342900">
-              <a:buAutoNum type="arabicPeriod"/>
-            </a:pPr>
-            <a:r>
-              <a:rPr lang="en-GB" sz="1200" dirty="0"/>
-              <a:t>Main menu</a:t>
+            <a:r>
+              <a:rPr lang="en-GB" sz="1200" b="1" dirty="0"/>
+              <a:t>	Loop menu</a:t>
             </a:r>
           </a:p>
         </p:txBody>
@@ -4203,10 +4133,355 @@
           </a:p>
         </p:txBody>
       </p:sp>
+      <p:sp>
+        <p:nvSpPr>
+          <p:cNvPr id="13" name="TextBox 12">
+            <a:extLst>
+              <a:ext uri="{FF2B5EF4-FFF2-40B4-BE49-F238E27FC236}">
+                <a16:creationId xmlns:a16="http://schemas.microsoft.com/office/drawing/2014/main" id="{53A8C10C-3482-A87A-D952-A4E53F4D5DD8}"/>
+              </a:ext>
+            </a:extLst>
+          </p:cNvPr>
+          <p:cNvSpPr txBox="1"/>
+          <p:nvPr/>
+        </p:nvSpPr>
+        <p:spPr>
+          <a:xfrm>
+            <a:off x="2066923" y="2589304"/>
+            <a:ext cx="1690436" cy="1015663"/>
+          </a:xfrm>
+          <a:prstGeom prst="rect">
+            <a:avLst/>
+          </a:prstGeom>
+          <a:noFill/>
+          <a:ln w="6350">
+            <a:solidFill>
+              <a:schemeClr val="tx1"/>
+            </a:solidFill>
+          </a:ln>
+        </p:spPr>
+        <p:txBody>
+          <a:bodyPr wrap="square" rtlCol="0">
+            <a:spAutoFit/>
+          </a:bodyPr>
+          <a:lstStyle/>
+          <a:p>
+            <a:r>
+              <a:rPr lang="en-GB" sz="1200" b="1" dirty="0"/>
+              <a:t>Loop menu</a:t>
+            </a:r>
+          </a:p>
+          <a:p>
+            <a:pPr marL="342900" indent="-342900">
+              <a:buFontTx/>
+              <a:buAutoNum type="arabicPeriod"/>
+            </a:pPr>
+            <a:r>
+              <a:rPr lang="en-GB" sz="1200" dirty="0"/>
+              <a:t>Buy ticket</a:t>
+            </a:r>
+          </a:p>
+          <a:p>
+            <a:pPr marL="342900" indent="-342900">
+              <a:buAutoNum type="arabicPeriod"/>
+            </a:pPr>
+            <a:r>
+              <a:rPr lang="en-GB" sz="1200" dirty="0"/>
+              <a:t>Show calendar </a:t>
+            </a:r>
+          </a:p>
+          <a:p>
+            <a:pPr marL="342900" indent="-342900">
+              <a:buAutoNum type="arabicPeriod"/>
+            </a:pPr>
+            <a:r>
+              <a:rPr lang="en-GB" sz="1200" dirty="0"/>
+              <a:t>Main menu</a:t>
+            </a:r>
+          </a:p>
+          <a:p>
+            <a:pPr marL="342900" indent="-342900">
+              <a:buAutoNum type="arabicPeriod"/>
+            </a:pPr>
+            <a:endParaRPr lang="en-GB" sz="1200" dirty="0"/>
+          </a:p>
+        </p:txBody>
+      </p:sp>
+      <p:sp>
+        <p:nvSpPr>
+          <p:cNvPr id="14" name="TextBox 13">
+            <a:extLst>
+              <a:ext uri="{FF2B5EF4-FFF2-40B4-BE49-F238E27FC236}">
+                <a16:creationId xmlns:a16="http://schemas.microsoft.com/office/drawing/2014/main" id="{3085DB89-2DE6-B323-643D-00536EA0C10B}"/>
+              </a:ext>
+            </a:extLst>
+          </p:cNvPr>
+          <p:cNvSpPr txBox="1"/>
+          <p:nvPr/>
+        </p:nvSpPr>
+        <p:spPr>
+          <a:xfrm>
+            <a:off x="7031450" y="3866174"/>
+            <a:ext cx="3748843" cy="2308324"/>
+          </a:xfrm>
+          <a:prstGeom prst="rect">
+            <a:avLst/>
+          </a:prstGeom>
+          <a:noFill/>
+          <a:ln w="6350">
+            <a:solidFill>
+              <a:schemeClr val="tx1"/>
+            </a:solidFill>
+          </a:ln>
+        </p:spPr>
+        <p:txBody>
+          <a:bodyPr wrap="square" rtlCol="0">
+            <a:spAutoFit/>
+          </a:bodyPr>
+          <a:lstStyle/>
+          <a:p>
+            <a:r>
+              <a:rPr lang="en-GB" sz="1200" b="1" dirty="0"/>
+              <a:t>Buy method</a:t>
+            </a:r>
+          </a:p>
+          <a:p>
+            <a:endParaRPr lang="en-GB" sz="1200" b="1" dirty="0"/>
+          </a:p>
+          <a:p>
+            <a:r>
+              <a:rPr lang="en-GB" sz="1200" dirty="0"/>
+              <a:t>Select id (checks id across the database) y/n</a:t>
+            </a:r>
+          </a:p>
+          <a:p>
+            <a:r>
+              <a:rPr lang="en-GB" sz="1200" dirty="0"/>
+              <a:t>- Print out performance (both circle and stall prices)</a:t>
+            </a:r>
+          </a:p>
+          <a:p>
+            <a:r>
+              <a:rPr lang="en-GB" sz="1200" dirty="0"/>
+              <a:t>	Confirm performance</a:t>
+            </a:r>
+          </a:p>
+          <a:p>
+            <a:r>
+              <a:rPr lang="en-GB" sz="1200" b="1" dirty="0"/>
+              <a:t>Quantity</a:t>
+            </a:r>
+          </a:p>
+          <a:p>
+            <a:r>
+              <a:rPr lang="en-GB" sz="1200" dirty="0"/>
+              <a:t>Print (n tickets have been added)</a:t>
+            </a:r>
+          </a:p>
+          <a:p>
+            <a:endParaRPr lang="en-GB" sz="1200" b="1" dirty="0"/>
+          </a:p>
+          <a:p>
+            <a:pPr marL="228600" indent="-228600">
+              <a:buAutoNum type="arabicPeriod"/>
+            </a:pPr>
+            <a:r>
+              <a:rPr lang="en-GB" sz="1200" dirty="0"/>
+              <a:t>View basket</a:t>
+            </a:r>
+          </a:p>
+          <a:p>
+            <a:pPr marL="228600" indent="-228600">
+              <a:buFontTx/>
+              <a:buAutoNum type="arabicPeriod"/>
+            </a:pPr>
+            <a:r>
+              <a:rPr lang="en-GB" sz="1200" b="1" dirty="0"/>
+              <a:t>Loop menu</a:t>
+            </a:r>
+            <a:endParaRPr lang="en-GB" sz="1200" dirty="0"/>
+          </a:p>
+          <a:p>
+            <a:pPr marL="342900" indent="-342900">
+              <a:buAutoNum type="arabicPeriod"/>
+            </a:pPr>
+            <a:endParaRPr lang="en-GB" sz="1200" dirty="0"/>
+          </a:p>
+          <a:p>
+            <a:pPr marL="342900" indent="-342900">
+              <a:buAutoNum type="arabicPeriod"/>
+            </a:pPr>
+            <a:endParaRPr lang="en-GB" sz="1200" dirty="0"/>
+          </a:p>
+        </p:txBody>
+      </p:sp>
     </p:spTree>
     <p:extLst>
       <p:ext uri="{BB962C8B-B14F-4D97-AF65-F5344CB8AC3E}">
         <p14:creationId xmlns:p14="http://schemas.microsoft.com/office/powerpoint/2010/main" val="2996394842"/>
+      </p:ext>
+    </p:extLst>
+  </p:cSld>
+  <p:clrMapOvr>
+    <a:masterClrMapping/>
+  </p:clrMapOvr>
+</p:sld>
+</file>
+
+<file path=ppt/slides/slide2.xml><?xml version="1.0" encoding="utf-8"?>
+<p:sld xmlns:a="http://schemas.openxmlformats.org/drawingml/2006/main" xmlns:r="http://schemas.openxmlformats.org/officeDocument/2006/relationships" xmlns:p="http://schemas.openxmlformats.org/presentationml/2006/main">
+  <p:cSld>
+    <p:spTree>
+      <p:nvGrpSpPr>
+        <p:cNvPr id="1" name=""/>
+        <p:cNvGrpSpPr/>
+        <p:nvPr/>
+      </p:nvGrpSpPr>
+      <p:grpSpPr>
+        <a:xfrm>
+          <a:off x="0" y="0"/>
+          <a:ext cx="0" cy="0"/>
+          <a:chOff x="0" y="0"/>
+          <a:chExt cx="0" cy="0"/>
+        </a:xfrm>
+      </p:grpSpPr>
+      <p:sp>
+        <p:nvSpPr>
+          <p:cNvPr id="4" name="TextBox 3">
+            <a:extLst>
+              <a:ext uri="{FF2B5EF4-FFF2-40B4-BE49-F238E27FC236}">
+                <a16:creationId xmlns:a16="http://schemas.microsoft.com/office/drawing/2014/main" id="{02A4D1C4-B1BE-4242-FDA9-A394C876E657}"/>
+              </a:ext>
+            </a:extLst>
+          </p:cNvPr>
+          <p:cNvSpPr txBox="1"/>
+          <p:nvPr/>
+        </p:nvSpPr>
+        <p:spPr>
+          <a:xfrm>
+            <a:off x="781045" y="786091"/>
+            <a:ext cx="3748843" cy="3600986"/>
+          </a:xfrm>
+          <a:prstGeom prst="rect">
+            <a:avLst/>
+          </a:prstGeom>
+          <a:noFill/>
+          <a:ln w="6350">
+            <a:solidFill>
+              <a:schemeClr val="tx1"/>
+            </a:solidFill>
+          </a:ln>
+        </p:spPr>
+        <p:txBody>
+          <a:bodyPr wrap="square" rtlCol="0">
+            <a:spAutoFit/>
+          </a:bodyPr>
+          <a:lstStyle/>
+          <a:p>
+            <a:r>
+              <a:rPr lang="en-GB" sz="1200" b="1" dirty="0"/>
+              <a:t>Quantity (Scenario 4 tickets)</a:t>
+            </a:r>
+          </a:p>
+          <a:p>
+            <a:endParaRPr lang="en-GB" sz="1200" b="1" dirty="0"/>
+          </a:p>
+          <a:p>
+            <a:r>
+              <a:rPr lang="en-GB" sz="1200" dirty="0"/>
+              <a:t>Inputted 4</a:t>
+            </a:r>
+          </a:p>
+          <a:p>
+            <a:endParaRPr lang="en-GB" sz="1200" dirty="0"/>
+          </a:p>
+          <a:p>
+            <a:r>
+              <a:rPr lang="en-GB" sz="1200" dirty="0"/>
+              <a:t>1/4</a:t>
+            </a:r>
+          </a:p>
+          <a:p>
+            <a:r>
+              <a:rPr lang="en-GB" sz="1200" dirty="0"/>
+              <a:t>Select seat type</a:t>
+            </a:r>
+          </a:p>
+          <a:p>
+            <a:r>
+              <a:rPr lang="en-GB" sz="1200" dirty="0"/>
+              <a:t>Select ticket type</a:t>
+            </a:r>
+          </a:p>
+          <a:p>
+            <a:endParaRPr lang="en-GB" sz="1200" dirty="0"/>
+          </a:p>
+          <a:p>
+            <a:r>
+              <a:rPr lang="en-GB" sz="1200" dirty="0"/>
+              <a:t>2/4</a:t>
+            </a:r>
+          </a:p>
+          <a:p>
+            <a:r>
+              <a:rPr lang="en-GB" sz="1200" dirty="0"/>
+              <a:t>Select seat type</a:t>
+            </a:r>
+          </a:p>
+          <a:p>
+            <a:r>
+              <a:rPr lang="en-GB" sz="1200" dirty="0"/>
+              <a:t>Select ticket type</a:t>
+            </a:r>
+          </a:p>
+          <a:p>
+            <a:endParaRPr lang="en-GB" sz="1200" dirty="0"/>
+          </a:p>
+          <a:p>
+            <a:r>
+              <a:rPr lang="en-GB" sz="1200" dirty="0"/>
+              <a:t>3/4</a:t>
+            </a:r>
+          </a:p>
+          <a:p>
+            <a:r>
+              <a:rPr lang="en-GB" sz="1200" dirty="0"/>
+              <a:t>Select seat type</a:t>
+            </a:r>
+          </a:p>
+          <a:p>
+            <a:r>
+              <a:rPr lang="en-GB" sz="1200" dirty="0"/>
+              <a:t>Select ticket type</a:t>
+            </a:r>
+          </a:p>
+          <a:p>
+            <a:endParaRPr lang="en-GB" sz="1200" dirty="0"/>
+          </a:p>
+          <a:p>
+            <a:r>
+              <a:rPr lang="en-GB" sz="1200" dirty="0"/>
+              <a:t>4/4</a:t>
+            </a:r>
+          </a:p>
+          <a:p>
+            <a:r>
+              <a:rPr lang="en-GB" sz="1200" dirty="0"/>
+              <a:t>Select seat type</a:t>
+            </a:r>
+          </a:p>
+          <a:p>
+            <a:r>
+              <a:rPr lang="en-GB" sz="1200" dirty="0"/>
+              <a:t>Select ticket type</a:t>
+            </a:r>
+          </a:p>
+        </p:txBody>
+      </p:sp>
+    </p:spTree>
+    <p:extLst>
+      <p:ext uri="{BB962C8B-B14F-4D97-AF65-F5344CB8AC3E}">
+        <p14:creationId xmlns:p14="http://schemas.microsoft.com/office/powerpoint/2010/main" val="173992145"/>
       </p:ext>
     </p:extLst>
   </p:cSld>

</xml_diff>

<commit_message>
updates to erd, database sql script and pptx
</commit_message>
<xml_diff>
--- a/ControllerBranch.pptx
+++ b/ControllerBranch.pptx
@@ -7,6 +7,7 @@
   <p:sldIdLst>
     <p:sldId id="256" r:id="rId2"/>
     <p:sldId id="257" r:id="rId3"/>
+    <p:sldId id="258" r:id="rId4"/>
   </p:sldIdLst>
   <p:sldSz cx="12192000" cy="6858000"/>
   <p:notesSz cx="6858000" cy="9144000"/>
@@ -3965,7 +3966,7 @@
         <p:spPr>
           <a:xfrm>
             <a:off x="9836828" y="169110"/>
-            <a:ext cx="2269953" cy="1938992"/>
+            <a:ext cx="2269953" cy="2862322"/>
           </a:xfrm>
           <a:prstGeom prst="rect">
             <a:avLst/>
@@ -4013,6 +4014,15 @@
             <a:r>
               <a:rPr lang="en-GB" sz="1200" dirty="0"/>
               <a:t>Confirmation of purchase</a:t>
+            </a:r>
+          </a:p>
+          <a:p>
+            <a:pPr marL="1257300" lvl="2" indent="-342900">
+              <a:buAutoNum type="arabicPeriod"/>
+            </a:pPr>
+            <a:r>
+              <a:rPr lang="en-GB" sz="1200" dirty="0"/>
+              <a:t>SQL check for available tickets still applies (confirmed)</a:t>
             </a:r>
           </a:p>
           <a:p>
@@ -4147,7 +4157,7 @@
         </p:nvSpPr>
         <p:spPr>
           <a:xfrm>
-            <a:off x="2066923" y="2589304"/>
+            <a:off x="42103" y="4863273"/>
             <a:ext cx="1690436" cy="1015663"/>
           </a:xfrm>
           <a:prstGeom prst="rect">
@@ -4221,8 +4231,8 @@
         </p:nvSpPr>
         <p:spPr>
           <a:xfrm>
-            <a:off x="7031450" y="3866174"/>
-            <a:ext cx="3748843" cy="2308324"/>
+            <a:off x="6629400" y="3606044"/>
+            <a:ext cx="3717759" cy="2862322"/>
           </a:xfrm>
           <a:prstGeom prst="rect">
             <a:avLst/>
@@ -4251,32 +4261,70 @@
           <a:p>
             <a:r>
               <a:rPr lang="en-GB" sz="1200" dirty="0"/>
-              <a:t>Select id (checks id across the database) y/n</a:t>
-            </a:r>
-          </a:p>
-          <a:p>
-            <a:r>
-              <a:rPr lang="en-GB" sz="1200" dirty="0"/>
-              <a:t>- Print out performance (both circle and stall prices)</a:t>
-            </a:r>
-          </a:p>
-          <a:p>
-            <a:r>
-              <a:rPr lang="en-GB" sz="1200" dirty="0"/>
-              <a:t>	Confirm performance</a:t>
-            </a:r>
-          </a:p>
-          <a:p>
-            <a:r>
-              <a:rPr lang="en-GB" sz="1200" b="1" dirty="0"/>
-              <a:t>Quantity</a:t>
-            </a:r>
-          </a:p>
-          <a:p>
-            <a:r>
-              <a:rPr lang="en-GB" sz="1200" dirty="0"/>
-              <a:t>Print (n tickets have been added)</a:t>
-            </a:r>
+              <a:t>Select id (checks id across the database) </a:t>
+            </a:r>
+          </a:p>
+          <a:p>
+            <a:r>
+              <a:rPr lang="en-GB" sz="1200" dirty="0"/>
+              <a:t>- [1]Print out performance (both circle and stall prices)</a:t>
+            </a:r>
+          </a:p>
+          <a:p>
+            <a:r>
+              <a:rPr lang="en-GB" sz="1200" dirty="0"/>
+              <a:t>	Confirm performance y/n</a:t>
+            </a:r>
+          </a:p>
+          <a:p>
+            <a:r>
+              <a:rPr lang="en-GB" sz="1200" dirty="0"/>
+              <a:t>Display seat availability (query &amp; local int variable)</a:t>
+            </a:r>
+          </a:p>
+          <a:p>
+            <a:endParaRPr lang="en-GB" sz="1200" dirty="0"/>
+          </a:p>
+          <a:p>
+            <a:r>
+              <a:rPr lang="en-GB" sz="1200" dirty="0"/>
+              <a:t>Single ticket at a time</a:t>
+            </a:r>
+          </a:p>
+          <a:p>
+            <a:pPr marL="171450" indent="-171450">
+              <a:buFontTx/>
+              <a:buChar char="-"/>
+            </a:pPr>
+            <a:r>
+              <a:rPr lang="en-GB" sz="1200" dirty="0"/>
+              <a:t>Select </a:t>
+            </a:r>
+            <a:r>
+              <a:rPr lang="en-GB" sz="1200" dirty="0" err="1"/>
+              <a:t>seatType</a:t>
+            </a:r>
+            <a:endParaRPr lang="en-GB" sz="1200" dirty="0"/>
+          </a:p>
+          <a:p>
+            <a:pPr marL="171450" indent="-171450">
+              <a:buFontTx/>
+              <a:buChar char="-"/>
+            </a:pPr>
+            <a:r>
+              <a:rPr lang="en-GB" sz="1200" dirty="0"/>
+              <a:t>Select concession type</a:t>
+            </a:r>
+          </a:p>
+          <a:p>
+            <a:pPr marL="171450" indent="-171450">
+              <a:buFontTx/>
+              <a:buChar char="-"/>
+            </a:pPr>
+            <a:endParaRPr lang="en-GB" sz="1200" dirty="0"/>
+          </a:p>
+          <a:p>
+            <a:endParaRPr lang="en-GB" sz="1200" dirty="0"/>
           </a:p>
           <a:p>
             <a:endParaRPr lang="en-GB" sz="1200" b="1" dirty="0"/>
@@ -4299,18 +4347,6 @@
               <a:rPr lang="en-GB" sz="1200" b="1" dirty="0"/>
               <a:t>Loop menu</a:t>
             </a:r>
-            <a:endParaRPr lang="en-GB" sz="1200" dirty="0"/>
-          </a:p>
-          <a:p>
-            <a:pPr marL="342900" indent="-342900">
-              <a:buAutoNum type="arabicPeriod"/>
-            </a:pPr>
-            <a:endParaRPr lang="en-GB" sz="1200" dirty="0"/>
-          </a:p>
-          <a:p>
-            <a:pPr marL="342900" indent="-342900">
-              <a:buAutoNum type="arabicPeriod"/>
-            </a:pPr>
             <a:endParaRPr lang="en-GB" sz="1200" dirty="0"/>
           </a:p>
         </p:txBody>
@@ -4359,8 +4395,146 @@
         </p:nvSpPr>
         <p:spPr>
           <a:xfrm>
-            <a:off x="781045" y="786091"/>
-            <a:ext cx="3748843" cy="3600986"/>
+            <a:off x="184485" y="717465"/>
+            <a:ext cx="6400800" cy="3600986"/>
+          </a:xfrm>
+          <a:prstGeom prst="rect">
+            <a:avLst/>
+          </a:prstGeom>
+          <a:solidFill>
+            <a:schemeClr val="accent2">
+              <a:lumMod val="20000"/>
+              <a:lumOff val="80000"/>
+            </a:schemeClr>
+          </a:solidFill>
+          <a:ln w="6350">
+            <a:solidFill>
+              <a:schemeClr val="tx1"/>
+            </a:solidFill>
+          </a:ln>
+        </p:spPr>
+        <p:txBody>
+          <a:bodyPr wrap="square" rtlCol="0">
+            <a:spAutoFit/>
+          </a:bodyPr>
+          <a:lstStyle/>
+          <a:p>
+            <a:r>
+              <a:rPr lang="en-GB" sz="1200" b="1" dirty="0"/>
+              <a:t>Quantity (Scenario 4 tickets – 2 circle, 2 stalls)</a:t>
+            </a:r>
+          </a:p>
+          <a:p>
+            <a:endParaRPr lang="en-GB" sz="1200" b="1" dirty="0"/>
+          </a:p>
+          <a:p>
+            <a:endParaRPr lang="en-GB" sz="1200" dirty="0"/>
+          </a:p>
+          <a:p>
+            <a:r>
+              <a:rPr lang="en-GB" sz="1200" dirty="0"/>
+              <a:t>1/4 – circle</a:t>
+            </a:r>
+          </a:p>
+          <a:p>
+            <a:r>
+              <a:rPr lang="en-GB" sz="1200" dirty="0"/>
+              <a:t>Select ticket type (case method [1(no concession),2(student),3(under 16)], apply concession)</a:t>
+            </a:r>
+          </a:p>
+          <a:p>
+            <a:r>
+              <a:rPr lang="en-GB" sz="1200" dirty="0"/>
+              <a:t>Create a new instance of ticket</a:t>
+            </a:r>
+          </a:p>
+          <a:p>
+            <a:r>
+              <a:rPr lang="en-GB" sz="1200" dirty="0"/>
+              <a:t>Add ticket in basket tickets array list</a:t>
+            </a:r>
+          </a:p>
+          <a:p>
+            <a:endParaRPr lang="en-GB" sz="1200" dirty="0"/>
+          </a:p>
+          <a:p>
+            <a:r>
+              <a:rPr lang="en-GB" sz="1200" dirty="0"/>
+              <a:t>2/4 – circle</a:t>
+            </a:r>
+          </a:p>
+          <a:p>
+            <a:r>
+              <a:rPr lang="en-GB" sz="1200" dirty="0"/>
+              <a:t>Select ticket type (case method [1(no concession),2(student),3(under 16)], apply concession</a:t>
+            </a:r>
+          </a:p>
+          <a:p>
+            <a:r>
+              <a:rPr lang="en-GB" sz="1200" dirty="0"/>
+              <a:t>Add ticket in basket tickets array list</a:t>
+            </a:r>
+          </a:p>
+          <a:p>
+            <a:endParaRPr lang="en-GB" sz="1200" dirty="0"/>
+          </a:p>
+          <a:p>
+            <a:r>
+              <a:rPr lang="en-GB" sz="1200" dirty="0"/>
+              <a:t>3/4 – stall</a:t>
+            </a:r>
+          </a:p>
+          <a:p>
+            <a:r>
+              <a:rPr lang="en-GB" sz="1200" dirty="0"/>
+              <a:t>Add ticket in basket tickets array list</a:t>
+            </a:r>
+          </a:p>
+          <a:p>
+            <a:r>
+              <a:rPr lang="en-GB" sz="1200" dirty="0"/>
+              <a:t>Select ticket type (case method [1(no concession),2(student),3(under 16)], apply concession</a:t>
+            </a:r>
+          </a:p>
+          <a:p>
+            <a:endParaRPr lang="en-GB" sz="1200" dirty="0"/>
+          </a:p>
+          <a:p>
+            <a:r>
+              <a:rPr lang="en-GB" sz="1200" dirty="0"/>
+              <a:t>4/4 – stall</a:t>
+            </a:r>
+          </a:p>
+          <a:p>
+            <a:r>
+              <a:rPr lang="en-GB" sz="1200" dirty="0"/>
+              <a:t>Add ticket in basket tickets array list</a:t>
+            </a:r>
+          </a:p>
+          <a:p>
+            <a:r>
+              <a:rPr lang="en-GB" sz="1200" dirty="0"/>
+              <a:t>Select ticket type (case method [1(no concession),2(student),3(under 16)], apply concession</a:t>
+            </a:r>
+          </a:p>
+        </p:txBody>
+      </p:sp>
+      <p:sp>
+        <p:nvSpPr>
+          <p:cNvPr id="3" name="TextBox 2">
+            <a:extLst>
+              <a:ext uri="{FF2B5EF4-FFF2-40B4-BE49-F238E27FC236}">
+                <a16:creationId xmlns:a16="http://schemas.microsoft.com/office/drawing/2014/main" id="{3DD48866-6F5E-3D89-7A18-5059EF471F1A}"/>
+              </a:ext>
+            </a:extLst>
+          </p:cNvPr>
+          <p:cNvSpPr txBox="1"/>
+          <p:nvPr/>
+        </p:nvSpPr>
+        <p:spPr>
+          <a:xfrm>
+            <a:off x="6956256" y="717465"/>
+            <a:ext cx="5051259" cy="3416320"/>
           </a:xfrm>
           <a:prstGeom prst="rect">
             <a:avLst/>
@@ -4380,100 +4554,248 @@
           <a:p>
             <a:r>
               <a:rPr lang="en-GB" sz="1200" b="1" dirty="0"/>
-              <a:t>Quantity (Scenario 4 tickets)</a:t>
+              <a:t>SQL</a:t>
             </a:r>
           </a:p>
           <a:p>
             <a:endParaRPr lang="en-GB" sz="1200" b="1" dirty="0"/>
           </a:p>
           <a:p>
-            <a:r>
-              <a:rPr lang="en-GB" sz="1200" dirty="0"/>
-              <a:t>Inputted 4</a:t>
-            </a:r>
-          </a:p>
-          <a:p>
+            <a:pPr marL="228600" indent="-228600">
+              <a:buAutoNum type="arabicPeriod"/>
+            </a:pPr>
+            <a:r>
+              <a:rPr lang="en-GB" sz="1200" dirty="0"/>
+              <a:t>Query to show user performance selection</a:t>
+            </a:r>
+          </a:p>
+          <a:p>
+            <a:pPr marL="228600" indent="-228600">
+              <a:buAutoNum type="arabicPeriod"/>
+            </a:pPr>
+            <a:r>
+              <a:rPr lang="en-GB" sz="1200" dirty="0"/>
+              <a:t>int </a:t>
+            </a:r>
+            <a:r>
+              <a:rPr lang="en-GB" sz="1200" dirty="0" err="1"/>
+              <a:t>circlea</a:t>
+            </a:r>
+            <a:r>
+              <a:rPr lang="en-GB" sz="1200" dirty="0"/>
+              <a:t> =  Query to check for availability of circle</a:t>
+            </a:r>
+          </a:p>
+          <a:p>
+            <a:pPr marL="228600" indent="-228600">
+              <a:buFontTx/>
+              <a:buAutoNum type="arabicPeriod"/>
+            </a:pPr>
+            <a:r>
+              <a:rPr lang="en-GB" sz="1200" dirty="0"/>
+              <a:t>int </a:t>
+            </a:r>
+            <a:r>
+              <a:rPr lang="en-GB" sz="1200" dirty="0" err="1"/>
+              <a:t>stalla</a:t>
+            </a:r>
+            <a:r>
+              <a:rPr lang="en-GB" sz="1200" dirty="0"/>
+              <a:t> =  Query to check for availability of stall</a:t>
+            </a:r>
+          </a:p>
+          <a:p>
+            <a:pPr marL="228600" indent="-228600">
+              <a:buAutoNum type="arabicPeriod"/>
+            </a:pPr>
             <a:endParaRPr lang="en-GB" sz="1200" dirty="0"/>
           </a:p>
           <a:p>
-            <a:r>
-              <a:rPr lang="en-GB" sz="1200" dirty="0"/>
-              <a:t>1/4</a:t>
-            </a:r>
-          </a:p>
-          <a:p>
-            <a:r>
-              <a:rPr lang="en-GB" sz="1200" dirty="0"/>
-              <a:t>Select seat type</a:t>
-            </a:r>
-          </a:p>
-          <a:p>
-            <a:r>
-              <a:rPr lang="en-GB" sz="1200" dirty="0"/>
-              <a:t>Select ticket type</a:t>
-            </a:r>
-          </a:p>
-          <a:p>
+            <a:pPr marL="228600" indent="-228600">
+              <a:buAutoNum type="arabicPeriod"/>
+            </a:pPr>
+            <a:endParaRPr lang="en-GB" sz="1200" b="1" dirty="0"/>
+          </a:p>
+          <a:p>
+            <a:endParaRPr lang="en-GB" sz="1200" b="1" dirty="0"/>
+          </a:p>
+          <a:p>
+            <a:r>
+              <a:rPr lang="en-GB" sz="1200" dirty="0"/>
+              <a:t>select id (checks id across the database) y/n</a:t>
+            </a:r>
+          </a:p>
+          <a:p>
+            <a:r>
+              <a:rPr lang="en-GB" sz="1200" dirty="0"/>
+              <a:t>- Print out performance (both circle and stall prices)</a:t>
+            </a:r>
+          </a:p>
+          <a:p>
+            <a:r>
+              <a:rPr lang="en-GB" sz="1200" dirty="0"/>
+              <a:t>	Confirm performance</a:t>
+            </a:r>
+          </a:p>
+          <a:p>
+            <a:r>
+              <a:rPr lang="en-GB" sz="1200" b="1" dirty="0"/>
+              <a:t>Input Quantity (check for availability) in SQL)</a:t>
+            </a:r>
+          </a:p>
+          <a:p>
+            <a:r>
+              <a:rPr lang="en-GB" sz="1200" dirty="0"/>
+              <a:t>Print (n tickets have been added)</a:t>
+            </a:r>
+          </a:p>
+          <a:p>
+            <a:endParaRPr lang="en-GB" sz="1200" b="1" dirty="0"/>
+          </a:p>
+          <a:p>
+            <a:pPr marL="228600" indent="-228600">
+              <a:buAutoNum type="arabicPeriod"/>
+            </a:pPr>
+            <a:r>
+              <a:rPr lang="en-GB" sz="1200" dirty="0"/>
+              <a:t>View basket</a:t>
+            </a:r>
+          </a:p>
+          <a:p>
+            <a:pPr marL="228600" indent="-228600">
+              <a:buFontTx/>
+              <a:buAutoNum type="arabicPeriod"/>
+            </a:pPr>
+            <a:r>
+              <a:rPr lang="en-GB" sz="1200" b="1" dirty="0"/>
+              <a:t>Loop menu</a:t>
+            </a:r>
             <a:endParaRPr lang="en-GB" sz="1200" dirty="0"/>
           </a:p>
           <a:p>
-            <a:r>
-              <a:rPr lang="en-GB" sz="1200" dirty="0"/>
-              <a:t>2/4</a:t>
-            </a:r>
-          </a:p>
-          <a:p>
-            <a:r>
-              <a:rPr lang="en-GB" sz="1200" dirty="0"/>
-              <a:t>Select seat type</a:t>
-            </a:r>
-          </a:p>
-          <a:p>
-            <a:r>
-              <a:rPr lang="en-GB" sz="1200" dirty="0"/>
-              <a:t>Select ticket type</a:t>
-            </a:r>
-          </a:p>
-          <a:p>
+            <a:pPr marL="342900" indent="-342900">
+              <a:buAutoNum type="arabicPeriod"/>
+            </a:pPr>
             <a:endParaRPr lang="en-GB" sz="1200" dirty="0"/>
           </a:p>
           <a:p>
-            <a:r>
-              <a:rPr lang="en-GB" sz="1200" dirty="0"/>
-              <a:t>3/4</a:t>
-            </a:r>
-          </a:p>
-          <a:p>
-            <a:r>
-              <a:rPr lang="en-GB" sz="1200" dirty="0"/>
-              <a:t>Select seat type</a:t>
-            </a:r>
-          </a:p>
-          <a:p>
-            <a:r>
-              <a:rPr lang="en-GB" sz="1200" dirty="0"/>
-              <a:t>Select ticket type</a:t>
-            </a:r>
-          </a:p>
-          <a:p>
+            <a:pPr marL="342900" indent="-342900">
+              <a:buAutoNum type="arabicPeriod"/>
+            </a:pPr>
             <a:endParaRPr lang="en-GB" sz="1200" dirty="0"/>
           </a:p>
-          <a:p>
-            <a:r>
-              <a:rPr lang="en-GB" sz="1200" dirty="0"/>
-              <a:t>4/4</a:t>
-            </a:r>
-          </a:p>
-          <a:p>
-            <a:r>
-              <a:rPr lang="en-GB" sz="1200" dirty="0"/>
-              <a:t>Select seat type</a:t>
-            </a:r>
-          </a:p>
-          <a:p>
-            <a:r>
-              <a:rPr lang="en-GB" sz="1200" dirty="0"/>
-              <a:t>Select ticket type</a:t>
+        </p:txBody>
+      </p:sp>
+      <p:sp>
+        <p:nvSpPr>
+          <p:cNvPr id="5" name="TextBox 4">
+            <a:extLst>
+              <a:ext uri="{FF2B5EF4-FFF2-40B4-BE49-F238E27FC236}">
+                <a16:creationId xmlns:a16="http://schemas.microsoft.com/office/drawing/2014/main" id="{1F0AD708-673A-CADB-D1B6-84970E8770DE}"/>
+              </a:ext>
+            </a:extLst>
+          </p:cNvPr>
+          <p:cNvSpPr txBox="1"/>
+          <p:nvPr/>
+        </p:nvSpPr>
+        <p:spPr>
+          <a:xfrm>
+            <a:off x="6956256" y="4496431"/>
+            <a:ext cx="4588049" cy="1938992"/>
+          </a:xfrm>
+          <a:prstGeom prst="rect">
+            <a:avLst/>
+          </a:prstGeom>
+          <a:noFill/>
+          <a:ln w="6350">
+            <a:solidFill>
+              <a:schemeClr val="tx1"/>
+            </a:solidFill>
+          </a:ln>
+        </p:spPr>
+        <p:txBody>
+          <a:bodyPr wrap="square" rtlCol="0">
+            <a:spAutoFit/>
+          </a:bodyPr>
+          <a:lstStyle/>
+          <a:p>
+            <a:r>
+              <a:rPr lang="en-GB" sz="1200" dirty="0"/>
+              <a:t>String performance id = query for performance</a:t>
+            </a:r>
+          </a:p>
+          <a:p>
+            <a:r>
+              <a:rPr lang="en-GB" sz="1200" dirty="0"/>
+              <a:t>String </a:t>
+            </a:r>
+            <a:r>
+              <a:rPr lang="en-GB" sz="1200" dirty="0" err="1"/>
+              <a:t>showname</a:t>
+            </a:r>
+            <a:endParaRPr lang="en-GB" sz="1200" dirty="0"/>
+          </a:p>
+          <a:p>
+            <a:r>
+              <a:rPr lang="en-GB" sz="1200" dirty="0"/>
+              <a:t>String </a:t>
+            </a:r>
+            <a:r>
+              <a:rPr lang="en-GB" sz="1200" dirty="0" err="1"/>
+              <a:t>starttime</a:t>
+            </a:r>
+            <a:endParaRPr lang="en-GB" sz="1200" dirty="0"/>
+          </a:p>
+          <a:p>
+            <a:r>
+              <a:rPr lang="en-GB" sz="1200" dirty="0"/>
+              <a:t>String </a:t>
+            </a:r>
+            <a:r>
+              <a:rPr lang="en-GB" sz="1200" dirty="0" err="1"/>
+              <a:t>showDate</a:t>
+            </a:r>
+            <a:endParaRPr lang="en-GB" sz="1200" dirty="0"/>
+          </a:p>
+          <a:p>
+            <a:r>
+              <a:rPr lang="en-GB" sz="1200" dirty="0"/>
+              <a:t>String </a:t>
+            </a:r>
+            <a:r>
+              <a:rPr lang="en-GB" sz="1200" dirty="0" err="1"/>
+              <a:t>SeatType</a:t>
+            </a:r>
+            <a:endParaRPr lang="en-GB" sz="1200" dirty="0"/>
+          </a:p>
+          <a:p>
+            <a:r>
+              <a:rPr lang="en-GB" sz="1200" dirty="0"/>
+              <a:t>String Concession</a:t>
+            </a:r>
+          </a:p>
+          <a:p>
+            <a:r>
+              <a:rPr lang="en-GB" sz="1200" dirty="0"/>
+              <a:t>Double Price</a:t>
+            </a:r>
+          </a:p>
+          <a:p>
+            <a:r>
+              <a:rPr lang="en-GB" sz="1200" dirty="0"/>
+              <a:t>Int circle availability</a:t>
+            </a:r>
+          </a:p>
+          <a:p>
+            <a:r>
+              <a:rPr lang="en-GB" sz="1200" dirty="0"/>
+              <a:t>Int stall availability</a:t>
+            </a:r>
+          </a:p>
+          <a:p>
+            <a:r>
+              <a:rPr lang="en-GB" sz="1200" dirty="0"/>
+              <a:t>Int total availability (circle + stall)</a:t>
             </a:r>
           </a:p>
         </p:txBody>
@@ -4482,6 +4804,85 @@
     <p:extLst>
       <p:ext uri="{BB962C8B-B14F-4D97-AF65-F5344CB8AC3E}">
         <p14:creationId xmlns:p14="http://schemas.microsoft.com/office/powerpoint/2010/main" val="173992145"/>
+      </p:ext>
+    </p:extLst>
+  </p:cSld>
+  <p:clrMapOvr>
+    <a:masterClrMapping/>
+  </p:clrMapOvr>
+</p:sld>
+</file>
+
+<file path=ppt/slides/slide3.xml><?xml version="1.0" encoding="utf-8"?>
+<p:sld xmlns:a="http://schemas.openxmlformats.org/drawingml/2006/main" xmlns:r="http://schemas.openxmlformats.org/officeDocument/2006/relationships" xmlns:p="http://schemas.openxmlformats.org/presentationml/2006/main">
+  <p:cSld>
+    <p:spTree>
+      <p:nvGrpSpPr>
+        <p:cNvPr id="1" name=""/>
+        <p:cNvGrpSpPr/>
+        <p:nvPr/>
+      </p:nvGrpSpPr>
+      <p:grpSpPr>
+        <a:xfrm>
+          <a:off x="0" y="0"/>
+          <a:ext cx="0" cy="0"/>
+          <a:chOff x="0" y="0"/>
+          <a:chExt cx="0" cy="0"/>
+        </a:xfrm>
+      </p:grpSpPr>
+      <p:sp>
+        <p:nvSpPr>
+          <p:cNvPr id="4" name="TextBox 3">
+            <a:extLst>
+              <a:ext uri="{FF2B5EF4-FFF2-40B4-BE49-F238E27FC236}">
+                <a16:creationId xmlns:a16="http://schemas.microsoft.com/office/drawing/2014/main" id="{C62FDADE-DB3D-E0E4-8FF9-CAAD66C33281}"/>
+              </a:ext>
+            </a:extLst>
+          </p:cNvPr>
+          <p:cNvSpPr txBox="1"/>
+          <p:nvPr/>
+        </p:nvSpPr>
+        <p:spPr>
+          <a:xfrm>
+            <a:off x="2526624" y="1663365"/>
+            <a:ext cx="1690436" cy="830997"/>
+          </a:xfrm>
+          <a:prstGeom prst="rect">
+            <a:avLst/>
+          </a:prstGeom>
+          <a:noFill/>
+          <a:ln w="6350">
+            <a:solidFill>
+              <a:schemeClr val="tx1"/>
+            </a:solidFill>
+          </a:ln>
+        </p:spPr>
+        <p:txBody>
+          <a:bodyPr wrap="square" rtlCol="0">
+            <a:spAutoFit/>
+          </a:bodyPr>
+          <a:lstStyle/>
+          <a:p>
+            <a:r>
+              <a:rPr lang="en-GB" sz="1200" b="1" dirty="0"/>
+              <a:t>Presentation</a:t>
+            </a:r>
+          </a:p>
+          <a:p>
+            <a:endParaRPr lang="en-GB" sz="1200" b="1" dirty="0"/>
+          </a:p>
+          <a:p>
+            <a:endParaRPr lang="en-GB" sz="1200" b="1" dirty="0"/>
+          </a:p>
+          <a:p>
+            <a:endParaRPr lang="en-GB" sz="1200" dirty="0"/>
+          </a:p>
+        </p:txBody>
+      </p:sp>
+    </p:spTree>
+    <p:extLst>
+      <p:ext uri="{BB962C8B-B14F-4D97-AF65-F5344CB8AC3E}">
+        <p14:creationId xmlns:p14="http://schemas.microsoft.com/office/powerpoint/2010/main" val="923713259"/>
       </p:ext>
     </p:extLst>
   </p:cSld>

</xml_diff>

<commit_message>
updates to db & backendcontroller
</commit_message>
<xml_diff>
--- a/ControllerBranch.pptx
+++ b/ControllerBranch.pptx
@@ -3966,7 +3966,7 @@
         <p:spPr>
           <a:xfrm>
             <a:off x="9836828" y="169110"/>
-            <a:ext cx="2269953" cy="2862322"/>
+            <a:ext cx="2269953" cy="2677656"/>
           </a:xfrm>
           <a:prstGeom prst="rect">
             <a:avLst/>
@@ -4023,15 +4023,6 @@
             <a:r>
               <a:rPr lang="en-GB" sz="1200" dirty="0"/>
               <a:t>SQL check for available tickets still applies (confirmed)</a:t>
-            </a:r>
-          </a:p>
-          <a:p>
-            <a:pPr marL="342900" indent="-342900">
-              <a:buAutoNum type="arabicPeriod"/>
-            </a:pPr>
-            <a:r>
-              <a:rPr lang="en-GB" sz="1200" dirty="0"/>
-              <a:t>Buy ticket</a:t>
             </a:r>
           </a:p>
           <a:p>
@@ -4232,7 +4223,7 @@
         <p:spPr>
           <a:xfrm>
             <a:off x="6629400" y="3606044"/>
-            <a:ext cx="3717759" cy="2862322"/>
+            <a:ext cx="3717759" cy="3046988"/>
           </a:xfrm>
           <a:prstGeom prst="rect">
             <a:avLst/>
@@ -4324,7 +4315,10 @@
             <a:endParaRPr lang="en-GB" sz="1200" dirty="0"/>
           </a:p>
           <a:p>
-            <a:endParaRPr lang="en-GB" sz="1200" dirty="0"/>
+            <a:r>
+              <a:rPr lang="en-GB" sz="1200" dirty="0"/>
+              <a:t>Added to basket</a:t>
+            </a:r>
           </a:p>
           <a:p>
             <a:endParaRPr lang="en-GB" sz="1200" b="1" dirty="0"/>
@@ -4335,7 +4329,16 @@
             </a:pPr>
             <a:r>
               <a:rPr lang="en-GB" sz="1200" dirty="0"/>
-              <a:t>View basket</a:t>
+              <a:t>Buy another ticket</a:t>
+            </a:r>
+          </a:p>
+          <a:p>
+            <a:pPr marL="228600" indent="-228600">
+              <a:buAutoNum type="arabicPeriod"/>
+            </a:pPr>
+            <a:r>
+              <a:rPr lang="en-GB" sz="1200" dirty="0"/>
+              <a:t>View basket (display basket)</a:t>
             </a:r>
           </a:p>
           <a:p>
@@ -4344,10 +4347,9 @@
               <a:buAutoNum type="arabicPeriod"/>
             </a:pPr>
             <a:r>
-              <a:rPr lang="en-GB" sz="1200" b="1" dirty="0"/>
-              <a:t>Loop menu</a:t>
-            </a:r>
-            <a:endParaRPr lang="en-GB" sz="1200" dirty="0"/>
+              <a:rPr lang="en-GB" sz="1200" dirty="0"/>
+              <a:t>Main menu</a:t>
+            </a:r>
           </a:p>
         </p:txBody>
       </p:sp>
@@ -4844,8 +4846,8 @@
         </p:nvSpPr>
         <p:spPr>
           <a:xfrm>
-            <a:off x="2526624" y="1663365"/>
-            <a:ext cx="1690436" cy="830997"/>
+            <a:off x="2526623" y="1663365"/>
+            <a:ext cx="3856129" cy="2862322"/>
           </a:xfrm>
           <a:prstGeom prst="rect">
             <a:avLst/>
@@ -4866,6 +4868,60 @@
             <a:r>
               <a:rPr lang="en-GB" sz="1200" b="1" dirty="0"/>
               <a:t>Presentation</a:t>
+            </a:r>
+          </a:p>
+          <a:p>
+            <a:endParaRPr lang="en-GB" sz="1200" b="1" dirty="0"/>
+          </a:p>
+          <a:p>
+            <a:r>
+              <a:rPr lang="en-GB" sz="1200" b="1" dirty="0"/>
+              <a:t>Client</a:t>
+            </a:r>
+          </a:p>
+          <a:p>
+            <a:r>
+              <a:rPr lang="en-GB" sz="1200" dirty="0"/>
+              <a:t>Demo on Moscow and how many implemented</a:t>
+            </a:r>
+          </a:p>
+          <a:p>
+            <a:r>
+              <a:rPr lang="en-GB" sz="1200" dirty="0"/>
+              <a:t>-how requirements were met (e.g. how they browse)</a:t>
+            </a:r>
+          </a:p>
+          <a:p>
+            <a:endParaRPr lang="en-GB" sz="1200" dirty="0"/>
+          </a:p>
+          <a:p>
+            <a:r>
+              <a:rPr lang="en-GB" sz="1200" b="1" dirty="0"/>
+              <a:t>Technical</a:t>
+            </a:r>
+          </a:p>
+          <a:p>
+            <a:r>
+              <a:rPr lang="en-GB" sz="1200" dirty="0"/>
+              <a:t>Pick and chose about key bits we done</a:t>
+            </a:r>
+          </a:p>
+          <a:p>
+            <a:r>
+              <a:rPr lang="en-GB" sz="1200" dirty="0"/>
+              <a:t>Things we think we done well</a:t>
+            </a:r>
+          </a:p>
+          <a:p>
+            <a:endParaRPr lang="en-GB" sz="1200" dirty="0"/>
+          </a:p>
+          <a:p>
+            <a:endParaRPr lang="en-GB" sz="1200" dirty="0"/>
+          </a:p>
+          <a:p>
+            <a:r>
+              <a:rPr lang="en-GB" sz="1200" dirty="0"/>
+              <a:t> </a:t>
             </a:r>
           </a:p>
           <a:p>

</xml_diff>